<commit_message>
Adds scenario details to poster
</commit_message>
<xml_diff>
--- a/Report/Poster Template.pptx
+++ b/Report/Poster Template.pptx
@@ -256,7 +256,7 @@
           <a:bodyPr lIns="0" rIns="0" tIns="0" bIns="0" anchor="b"/>
           <a:p>
             <a:pPr algn="r"/>
-            <a:fld id="{926E188E-883D-48C3-86D5-1898E6ABDC46}" type="slidenum">
+            <a:fld id="{585CE864-5D64-4D70-89CB-10CDB3D2B2D6}" type="slidenum">
               <a:rPr b="0" lang="en-US" sz="1400" spc="-1" strike="noStrike">
                 <a:solidFill>
                   <a:srgbClr val="000000"/>
@@ -309,7 +309,7 @@
       </p:grpSpPr>
       <p:sp>
         <p:nvSpPr>
-          <p:cNvPr id="65" name="PlaceHolder 1"/>
+          <p:cNvPr id="71" name="PlaceHolder 1"/>
           <p:cNvSpPr>
             <a:spLocks noGrp="1"/>
           </p:cNvSpPr>
@@ -320,7 +320,7 @@
         <p:spPr>
           <a:xfrm>
             <a:off x="685800" y="4343400"/>
-            <a:ext cx="5485320" cy="4113720"/>
+            <a:ext cx="5484600" cy="4113000"/>
           </a:xfrm>
           <a:prstGeom prst="rect">
             <a:avLst/>
@@ -345,14 +345,14 @@
       </p:sp>
       <p:sp>
         <p:nvSpPr>
-          <p:cNvPr id="66" name="CustomShape 2"/>
+          <p:cNvPr id="72" name="CustomShape 2"/>
           <p:cNvSpPr/>
           <p:nvPr/>
         </p:nvSpPr>
         <p:spPr>
           <a:xfrm>
             <a:off x="3884760" y="8685360"/>
-            <a:ext cx="2970720" cy="456120"/>
+            <a:ext cx="2970000" cy="455400"/>
           </a:xfrm>
           <a:prstGeom prst="rect">
             <a:avLst/>
@@ -376,7 +376,7 @@
                 <a:spcPct val="100000"/>
               </a:lnSpc>
             </a:pPr>
-            <a:fld id="{84AF2D89-5AF0-42F0-AA25-72E429800E58}" type="slidenum">
+            <a:fld id="{64F82599-278E-4F41-B357-9AF119CF90F6}" type="slidenum">
               <a:rPr b="0" lang="en-US" sz="1200" spc="-1" strike="noStrike">
                 <a:solidFill>
                   <a:srgbClr val="000000"/>
@@ -1922,7 +1922,7 @@
         <p:spPr>
           <a:xfrm>
             <a:off x="-439560" y="32436360"/>
-            <a:ext cx="26079480" cy="2578320"/>
+            <a:ext cx="26078760" cy="2577600"/>
           </a:xfrm>
           <a:prstGeom prst="rect">
             <a:avLst/>
@@ -1941,7 +1941,7 @@
         <p:spPr>
           <a:xfrm>
             <a:off x="-439560" y="0"/>
-            <a:ext cx="26079480" cy="3899880"/>
+            <a:ext cx="26078760" cy="3899160"/>
           </a:xfrm>
           <a:prstGeom prst="rect">
             <a:avLst/>
@@ -1985,7 +1985,7 @@
         <p:spPr>
           <a:xfrm>
             <a:off x="925200" y="34711200"/>
-            <a:ext cx="10525320" cy="699120"/>
+            <a:ext cx="10524600" cy="698400"/>
           </a:xfrm>
           <a:prstGeom prst="rect">
             <a:avLst/>
@@ -2047,7 +2047,7 @@
         <p:spPr>
           <a:xfrm>
             <a:off x="15849720" y="1646640"/>
-            <a:ext cx="8160840" cy="1800000"/>
+            <a:ext cx="8160120" cy="1799280"/>
           </a:xfrm>
           <a:prstGeom prst="rect">
             <a:avLst/>
@@ -2137,7 +2137,7 @@
         <p:spPr>
           <a:xfrm>
             <a:off x="794520" y="637200"/>
-            <a:ext cx="13965480" cy="2832840"/>
+            <a:ext cx="13964760" cy="2832120"/>
           </a:xfrm>
           <a:prstGeom prst="rect">
             <a:avLst/>
@@ -2162,7 +2162,7 @@
               </a:lnSpc>
             </a:pPr>
             <a:r>
-              <a:rPr b="1" lang="en-US" sz="18000" spc="-293" strike="noStrike">
+              <a:rPr b="1" lang="en-US" sz="18000" spc="-287" strike="noStrike">
                 <a:solidFill>
                   <a:srgbClr val="ffffff"/>
                 </a:solidFill>
@@ -2203,7 +2203,7 @@
         <p:spPr>
           <a:xfrm>
             <a:off x="20595600" y="34798320"/>
-            <a:ext cx="3598560" cy="486720"/>
+            <a:ext cx="3597840" cy="486000"/>
           </a:xfrm>
           <a:prstGeom prst="rect">
             <a:avLst/>
@@ -2222,7 +2222,7 @@
         <p:spPr>
           <a:xfrm>
             <a:off x="9615240" y="1193400"/>
-            <a:ext cx="7720920" cy="2526840"/>
+            <a:ext cx="7720200" cy="2526120"/>
           </a:xfrm>
           <a:prstGeom prst="rect">
             <a:avLst/>
@@ -2243,7 +2243,7 @@
           <a:p>
             <a:pPr algn="just">
               <a:lnSpc>
-                <a:spcPts val="351"/>
+                <a:spcPts val="44"/>
               </a:lnSpc>
             </a:pPr>
             <a:r>
@@ -2284,7 +2284,7 @@
         <p:spPr>
           <a:xfrm>
             <a:off x="-439560" y="0"/>
-            <a:ext cx="26079480" cy="3899880"/>
+            <a:ext cx="26078760" cy="3899160"/>
           </a:xfrm>
           <a:prstGeom prst="rect">
             <a:avLst/>
@@ -2332,7 +2332,7 @@
         <p:spPr>
           <a:xfrm>
             <a:off x="20595600" y="34798320"/>
-            <a:ext cx="3598560" cy="486720"/>
+            <a:ext cx="3597840" cy="486000"/>
           </a:xfrm>
           <a:prstGeom prst="rect">
             <a:avLst/>
@@ -2351,7 +2351,7 @@
         <p:spPr>
           <a:xfrm>
             <a:off x="794520" y="1073880"/>
-            <a:ext cx="13965480" cy="2832840"/>
+            <a:ext cx="13964760" cy="2832120"/>
           </a:xfrm>
           <a:prstGeom prst="rect">
             <a:avLst/>
@@ -2376,7 +2376,7 @@
               </a:lnSpc>
             </a:pPr>
             <a:r>
-              <a:rPr b="1" lang="en-US" sz="18000" spc="-293" strike="noStrike">
+              <a:rPr b="1" lang="en-US" sz="18000" spc="-287" strike="noStrike">
                 <a:solidFill>
                   <a:srgbClr val="ffffff"/>
                 </a:solidFill>
@@ -2413,7 +2413,7 @@
         <p:spPr>
           <a:xfrm>
             <a:off x="9447480" y="1551240"/>
-            <a:ext cx="7720920" cy="2526840"/>
+            <a:ext cx="7720200" cy="2526120"/>
           </a:xfrm>
           <a:prstGeom prst="rect">
             <a:avLst/>
@@ -2434,7 +2434,7 @@
           <a:p>
             <a:pPr algn="just">
               <a:lnSpc>
-                <a:spcPts val="351"/>
+                <a:spcPts val="44"/>
               </a:lnSpc>
             </a:pPr>
             <a:r>
@@ -2479,7 +2479,7 @@
         <p:spPr>
           <a:xfrm>
             <a:off x="794520" y="3924720"/>
-            <a:ext cx="24647040" cy="1602360"/>
+            <a:ext cx="24646320" cy="1601640"/>
           </a:xfrm>
           <a:prstGeom prst="rect">
             <a:avLst/>
@@ -2854,7 +2854,7 @@
         <p:spPr>
           <a:xfrm>
             <a:off x="15849720" y="1646640"/>
-            <a:ext cx="8160840" cy="1800000"/>
+            <a:ext cx="8160120" cy="1799280"/>
           </a:xfrm>
           <a:prstGeom prst="rect">
             <a:avLst/>
@@ -2880,7 +2880,7 @@
         <p:spPr>
           <a:xfrm>
             <a:off x="1164240" y="5581440"/>
-            <a:ext cx="22872240" cy="2007360"/>
+            <a:ext cx="22871520" cy="2006640"/>
           </a:xfrm>
           <a:prstGeom prst="rect">
             <a:avLst/>
@@ -2914,7 +2914,7 @@
               </a:rPr>
               <a:t>Optimal Overtaking for Autonomous Vehicles</a:t>
             </a:r>
-            <a:endParaRPr b="0" lang="en-US" sz="8800" spc="-1" strike="noStrike">
+            <a:endParaRPr b="0" lang="en-US" sz="1800" spc="-1" strike="noStrike">
               <a:solidFill>
                 <a:srgbClr val="000000"/>
               </a:solidFill>
@@ -2936,8 +2936,8 @@
         </p:nvSpPr>
         <p:spPr>
           <a:xfrm>
-            <a:off x="921240" y="16364880"/>
-            <a:ext cx="9272160" cy="3660120"/>
+            <a:off x="914400" y="14713920"/>
+            <a:ext cx="9271440" cy="6225840"/>
           </a:xfrm>
           <a:prstGeom prst="rect">
             <a:avLst/>
@@ -2956,7 +2956,7 @@
         <p:txBody>
           <a:bodyPr lIns="90000" rIns="90000" tIns="45000" bIns="45000"/>
           <a:p>
-            <a:pPr marL="432000" indent="-323280">
+            <a:pPr marL="432000" indent="-322560">
               <a:lnSpc>
                 <a:spcPct val="100000"/>
               </a:lnSpc>
@@ -2995,7 +2995,7 @@
             </a:endParaRPr>
           </a:p>
           <a:p>
-            <a:pPr marL="432000" indent="-323280" algn="just">
+            <a:pPr marL="432000" indent="-322560" algn="just">
               <a:lnSpc>
                 <a:spcPct val="100000"/>
               </a:lnSpc>
@@ -3034,7 +3034,7 @@
             </a:endParaRPr>
           </a:p>
           <a:p>
-            <a:pPr marL="432000" indent="-323280" algn="just">
+            <a:pPr marL="432000" indent="-322560" algn="just">
               <a:lnSpc>
                 <a:spcPct val="100000"/>
               </a:lnSpc>
@@ -3072,6 +3072,84 @@
               <a:latin typeface="Arial"/>
             </a:endParaRPr>
           </a:p>
+          <a:p>
+            <a:pPr marL="432000" indent="-322560" algn="just">
+              <a:lnSpc>
+                <a:spcPct val="100000"/>
+              </a:lnSpc>
+              <a:buClr>
+                <a:srgbClr val="000000"/>
+              </a:buClr>
+              <a:buSzPct val="45000"/>
+              <a:buFont typeface="Symbol"/>
+              <a:buChar char=""/>
+            </a:pPr>
+            <a:r>
+              <a:rPr b="0" lang="en-US" sz="3200" spc="-1" strike="noStrike">
+                <a:solidFill>
+                  <a:srgbClr val="000000"/>
+                </a:solidFill>
+                <a:uFill>
+                  <a:solidFill>
+                    <a:srgbClr val="ffffff"/>
+                  </a:solidFill>
+                </a:uFill>
+                <a:latin typeface="Arial"/>
+                <a:ea typeface="DejaVu Sans"/>
+              </a:rPr>
+              <a:t>At each instant, the overtaking and following manoeuvres are evaluated against each other</a:t>
+            </a:r>
+            <a:endParaRPr b="0" lang="en-US" sz="1800" spc="-1" strike="noStrike">
+              <a:solidFill>
+                <a:srgbClr val="000000"/>
+              </a:solidFill>
+              <a:uFill>
+                <a:solidFill>
+                  <a:srgbClr val="ffffff"/>
+                </a:solidFill>
+              </a:uFill>
+              <a:latin typeface="Arial"/>
+            </a:endParaRPr>
+          </a:p>
+          <a:p>
+            <a:pPr marL="432000" indent="-322560" algn="just">
+              <a:lnSpc>
+                <a:spcPct val="100000"/>
+              </a:lnSpc>
+              <a:buClr>
+                <a:srgbClr val="000000"/>
+              </a:buClr>
+              <a:buSzPct val="45000"/>
+              <a:buFont typeface="Symbol"/>
+              <a:buChar char=""/>
+            </a:pPr>
+            <a:r>
+              <a:rPr b="0" lang="en-US" sz="3200" spc="-1" strike="noStrike">
+                <a:solidFill>
+                  <a:srgbClr val="000000"/>
+                </a:solidFill>
+                <a:uFill>
+                  <a:solidFill>
+                    <a:srgbClr val="ffffff"/>
+                  </a:solidFill>
+                </a:uFill>
+                <a:latin typeface="Arial"/>
+                <a:ea typeface="DejaVu Sans"/>
+              </a:rPr>
+              <a:t>This is done using an objective function that compares the kinematics of the manoeuvres, the deviation from the reference speed and the decision robustness</a:t>
+            </a:r>
+            <a:endParaRPr b="0" lang="en-US" sz="1800" spc="-1" strike="noStrike">
+              <a:solidFill>
+                <a:srgbClr val="000000"/>
+              </a:solidFill>
+              <a:uFill>
+                <a:solidFill>
+                  <a:srgbClr val="ffffff"/>
+                </a:solidFill>
+              </a:uFill>
+              <a:latin typeface="Arial"/>
+            </a:endParaRPr>
+          </a:p>
         </p:txBody>
       </p:sp>
       <p:sp>
@@ -3083,7 +3161,7 @@
         <p:spPr>
           <a:xfrm>
             <a:off x="1146600" y="27518400"/>
-            <a:ext cx="8737200" cy="6831720"/>
+            <a:ext cx="8736480" cy="6831000"/>
           </a:xfrm>
           <a:prstGeom prst="rect">
             <a:avLst/>
@@ -3108,8 +3186,8 @@
         </p:nvSpPr>
         <p:spPr>
           <a:xfrm>
-            <a:off x="1128240" y="25482600"/>
-            <a:ext cx="4899600" cy="751680"/>
+            <a:off x="1128240" y="24654600"/>
+            <a:ext cx="4898880" cy="750960"/>
           </a:xfrm>
           <a:prstGeom prst="rect">
             <a:avLst/>
@@ -3134,8 +3212,8 @@
         </p:nvSpPr>
         <p:spPr>
           <a:xfrm>
-            <a:off x="1146600" y="24052680"/>
-            <a:ext cx="8737200" cy="714960"/>
+            <a:off x="1146600" y="23224680"/>
+            <a:ext cx="8736480" cy="714240"/>
           </a:xfrm>
           <a:prstGeom prst="rect">
             <a:avLst/>
@@ -3164,8 +3242,8 @@
         </p:blipFill>
         <p:spPr>
           <a:xfrm>
-            <a:off x="2182320" y="12250440"/>
-            <a:ext cx="7509960" cy="3568320"/>
+            <a:off x="2913840" y="11795760"/>
+            <a:ext cx="5590080" cy="2655720"/>
           </a:xfrm>
           <a:prstGeom prst="rect">
             <a:avLst/>
@@ -3183,8 +3261,8 @@
         </p:nvSpPr>
         <p:spPr>
           <a:xfrm>
-            <a:off x="10301760" y="25135920"/>
-            <a:ext cx="13734720" cy="7184520"/>
+            <a:off x="10301760" y="10913040"/>
+            <a:ext cx="13734000" cy="13136760"/>
           </a:xfrm>
           <a:prstGeom prst="rect">
             <a:avLst/>
@@ -3209,8 +3287,8 @@
         </p:nvSpPr>
         <p:spPr>
           <a:xfrm>
-            <a:off x="10301760" y="10913040"/>
-            <a:ext cx="13734720" cy="13137480"/>
+            <a:off x="935280" y="7716960"/>
+            <a:ext cx="9288360" cy="3198960"/>
           </a:xfrm>
           <a:prstGeom prst="rect">
             <a:avLst/>
@@ -3226,6 +3304,87 @@
           <a:effectRef idx="0"/>
           <a:fontRef idx="minor"/>
         </p:style>
+        <p:txBody>
+          <a:bodyPr lIns="90000" rIns="90000" tIns="45000" bIns="45000"/>
+          <a:p>
+            <a:pPr marL="432000" indent="-322560">
+              <a:lnSpc>
+                <a:spcPct val="100000"/>
+              </a:lnSpc>
+              <a:buClr>
+                <a:srgbClr val="000000"/>
+              </a:buClr>
+              <a:buSzPct val="45000"/>
+              <a:buFont typeface="Wingdings" charset="2"/>
+              <a:buChar char=""/>
+            </a:pPr>
+            <a:r>
+              <a:rPr b="1" lang="en-US" sz="4800" spc="-1" strike="noStrike">
+                <a:solidFill>
+                  <a:srgbClr val="000000"/>
+                </a:solidFill>
+                <a:uFill>
+                  <a:solidFill>
+                    <a:srgbClr val="ffffff"/>
+                  </a:solidFill>
+                </a:uFill>
+                <a:latin typeface="Arial"/>
+                <a:ea typeface="DejaVu Sans"/>
+              </a:rPr>
+              <a:t>Purpose</a:t>
+            </a:r>
+            <a:endParaRPr b="0" lang="en-US" sz="1800" spc="-1" strike="noStrike">
+              <a:solidFill>
+                <a:srgbClr val="000000"/>
+              </a:solidFill>
+              <a:uFill>
+                <a:solidFill>
+                  <a:srgbClr val="ffffff"/>
+                </a:solidFill>
+              </a:uFill>
+              <a:latin typeface="Arial"/>
+            </a:endParaRPr>
+          </a:p>
+          <a:p>
+            <a:pPr marL="432000" indent="-322560" algn="just">
+              <a:lnSpc>
+                <a:spcPct val="100000"/>
+              </a:lnSpc>
+              <a:buClr>
+                <a:srgbClr val="000000"/>
+              </a:buClr>
+              <a:buSzPct val="45000"/>
+              <a:buFont typeface="Wingdings" charset="2"/>
+              <a:buChar char=""/>
+            </a:pPr>
+            <a:r>
+              <a:rPr b="0" lang="en-US" sz="3200" spc="-1" strike="noStrike">
+                <a:solidFill>
+                  <a:srgbClr val="000000"/>
+                </a:solidFill>
+                <a:uFill>
+                  <a:solidFill>
+                    <a:srgbClr val="ffffff"/>
+                  </a:solidFill>
+                </a:uFill>
+                <a:latin typeface="Arial"/>
+                <a:ea typeface="DejaVu Sans"/>
+              </a:rPr>
+              <a:t>Cars often find themselves behind slower moving vehicles such as trucks on the highway. In these situations, they must make the decision to either overtake or trail the leading vehicle, weighing both decisions to make a safe, yet optimal manoeuvre. </a:t>
+            </a:r>
+            <a:endParaRPr b="0" lang="en-US" sz="1800" spc="-1" strike="noStrike">
+              <a:solidFill>
+                <a:srgbClr val="000000"/>
+              </a:solidFill>
+              <a:uFill>
+                <a:solidFill>
+                  <a:srgbClr val="ffffff"/>
+                </a:solidFill>
+              </a:uFill>
+              <a:latin typeface="Arial"/>
+            </a:endParaRPr>
+          </a:p>
+        </p:txBody>
       </p:sp>
       <p:sp>
         <p:nvSpPr>
@@ -3235,8 +3394,8 @@
         </p:nvSpPr>
         <p:spPr>
           <a:xfrm>
-            <a:off x="935280" y="8112960"/>
-            <a:ext cx="9289080" cy="3199680"/>
+            <a:off x="822960" y="21305520"/>
+            <a:ext cx="9485280" cy="2881440"/>
           </a:xfrm>
           <a:prstGeom prst="rect">
             <a:avLst/>
@@ -3255,7 +3414,7 @@
         <p:txBody>
           <a:bodyPr lIns="90000" rIns="90000" tIns="45000" bIns="45000"/>
           <a:p>
-            <a:pPr marL="432000" indent="-323280">
+            <a:pPr marL="432000" indent="-322560">
               <a:lnSpc>
                 <a:spcPct val="100000"/>
               </a:lnSpc>
@@ -3279,7 +3438,7 @@
                 <a:latin typeface="Arial"/>
                 <a:ea typeface="DejaVu Sans"/>
               </a:rPr>
-              <a:t>Purpose</a:t>
+              <a:t>Evaluation</a:t>
             </a:r>
             <a:endParaRPr b="0" lang="en-US" sz="1800" spc="-1" strike="noStrike">
               <a:solidFill>
@@ -3294,7 +3453,60 @@
             </a:endParaRPr>
           </a:p>
           <a:p>
-            <a:pPr marL="432000" indent="-323280" algn="just">
+            <a:pPr marL="108360" indent="-322560" algn="just">
+              <a:lnSpc>
+                <a:spcPct val="100000"/>
+              </a:lnSpc>
+              <a:buClr>
+                <a:srgbClr val="000000"/>
+              </a:buClr>
+              <a:buFont typeface="Liberation Serif"/>
+              <a:buAutoNum type="romanUcPeriod"/>
+            </a:pPr>
+            <a:r>
+              <a:rPr b="0" lang="en-US" sz="3200" spc="-1" strike="noStrike">
+                <a:solidFill>
+                  <a:srgbClr val="000000"/>
+                </a:solidFill>
+                <a:uFill>
+                  <a:solidFill>
+                    <a:srgbClr val="ffffff"/>
+                  </a:solidFill>
+                </a:uFill>
+                <a:latin typeface="Arial"/>
+                <a:ea typeface="DejaVu Sans"/>
+              </a:rPr>
+              <a:t>  </a:t>
+            </a:r>
+            <a:r>
+              <a:rPr b="0" i="1" lang="en-US" sz="3200" spc="-1" strike="noStrike">
+                <a:solidFill>
+                  <a:srgbClr val="000000"/>
+                </a:solidFill>
+                <a:uFill>
+                  <a:solidFill>
+                    <a:srgbClr val="ffffff"/>
+                  </a:solidFill>
+                </a:uFill>
+                <a:latin typeface="Arial"/>
+                <a:ea typeface="DejaVu Sans"/>
+              </a:rPr>
+              <a:t>Scenario 1 - Leading vehicle with deceleration - </a:t>
+            </a:r>
+            <a:endParaRPr b="0" lang="en-US" sz="1800" spc="-1" strike="noStrike">
+              <a:solidFill>
+                <a:srgbClr val="000000"/>
+              </a:solidFill>
+              <a:uFill>
+                <a:solidFill>
+                  <a:srgbClr val="ffffff"/>
+                </a:solidFill>
+              </a:uFill>
+              <a:latin typeface="Arial"/>
+            </a:endParaRPr>
+          </a:p>
+          <a:p>
+            <a:pPr lvl="1" marL="432000" indent="-216000" algn="just">
               <a:lnSpc>
                 <a:spcPct val="100000"/>
               </a:lnSpc>
@@ -3318,7 +3530,7 @@
                 <a:latin typeface="Arial"/>
                 <a:ea typeface="DejaVu Sans"/>
               </a:rPr>
-              <a:t>Cars often find themselves behind slower moving vehicles such as trucks on the highway. In these situations, they must make the decision to either overtake or trail the leading vehicle, weighing both decisions to make a safe, yet optimal manoeuvre. </a:t>
+              <a:t>The host follows a vehicle that slows down making an overtake necessary. The reference speed is 70kph. Initially, when the pilot drives at 68kph,the overtake is more expensive.</a:t>
             </a:r>
             <a:endParaRPr b="0" lang="en-US" sz="1800" spc="-1" strike="noStrike">
               <a:solidFill>
@@ -3334,16 +3546,39 @@
           </a:p>
         </p:txBody>
       </p:sp>
-      <p:sp>
-        <p:nvSpPr>
-          <p:cNvPr id="63" name="CustomShape 10"/>
-          <p:cNvSpPr/>
+      <p:pic>
+        <p:nvPicPr>
+          <p:cNvPr id="63" name="" descr=""/>
+          <p:cNvPicPr/>
           <p:nvPr/>
-        </p:nvSpPr>
-        <p:spPr>
-          <a:xfrm>
-            <a:off x="902880" y="20299680"/>
-            <a:ext cx="9486000" cy="4467960"/>
+        </p:nvPicPr>
+        <p:blipFill>
+          <a:blip r:embed="rId2"/>
+          <a:stretch/>
+        </p:blipFill>
+        <p:spPr>
+          <a:xfrm>
+            <a:off x="883800" y="25073640"/>
+            <a:ext cx="9083160" cy="2724120"/>
+          </a:xfrm>
+          <a:prstGeom prst="rect">
+            <a:avLst/>
+          </a:prstGeom>
+          <a:ln>
+            <a:noFill/>
+          </a:ln>
+        </p:spPr>
+      </p:pic>
+      <p:sp>
+        <p:nvSpPr>
+          <p:cNvPr id="64" name="TextShape 10"/>
+          <p:cNvSpPr txBox="1"/>
+          <p:nvPr/>
+        </p:nvSpPr>
+        <p:spPr>
+          <a:xfrm>
+            <a:off x="11064240" y="7961760"/>
+            <a:ext cx="13505040" cy="1913760"/>
           </a:xfrm>
           <a:prstGeom prst="rect">
             <a:avLst/>
@@ -3353,28 +3588,16 @@
             <a:noFill/>
           </a:ln>
         </p:spPr>
-        <p:style>
-          <a:lnRef idx="0"/>
-          <a:fillRef idx="0"/>
-          <a:effectRef idx="0"/>
-          <a:fontRef idx="minor"/>
-        </p:style>
         <p:txBody>
           <a:bodyPr lIns="90000" rIns="90000" tIns="45000" bIns="45000"/>
           <a:p>
-            <a:pPr marL="432000" indent="-323280">
+            <a:pPr algn="just">
               <a:lnSpc>
                 <a:spcPct val="100000"/>
               </a:lnSpc>
-              <a:buClr>
-                <a:srgbClr val="000000"/>
-              </a:buClr>
-              <a:buSzPct val="45000"/>
-              <a:buFont typeface="Wingdings" charset="2"/>
-              <a:buChar char=""/>
             </a:pPr>
             <a:r>
-              <a:rPr b="1" lang="en-US" sz="4800" spc="-1" strike="noStrike">
+              <a:rPr b="0" i="1" lang="en-US" sz="3200" spc="-1" strike="noStrike">
                 <a:solidFill>
                   <a:srgbClr val="000000"/>
                 </a:solidFill>
@@ -3386,7 +3609,22 @@
                 <a:latin typeface="Arial"/>
                 <a:ea typeface="DejaVu Sans"/>
               </a:rPr>
-              <a:t>To overtake or not to overtake</a:t>
+              <a:t> </a:t>
+            </a:r>
+            <a:r>
+              <a:rPr b="0" i="1" lang="en-US" sz="3200" spc="-1" strike="noStrike">
+                <a:solidFill>
+                  <a:srgbClr val="000000"/>
+                </a:solidFill>
+                <a:uFill>
+                  <a:solidFill>
+                    <a:srgbClr val="ffffff"/>
+                  </a:solidFill>
+                </a:uFill>
+                <a:latin typeface="Arial"/>
+                <a:ea typeface="DejaVu Sans"/>
+              </a:rPr>
+              <a:t>II. Scenario 2 – Adjacent vehicle with deceleration</a:t>
             </a:r>
             <a:endParaRPr b="0" lang="en-US" sz="1800" spc="-1" strike="noStrike">
               <a:solidFill>
@@ -3401,16 +3639,10 @@
             </a:endParaRPr>
           </a:p>
           <a:p>
-            <a:pPr marL="432000" indent="-323280" algn="just">
+            <a:pPr algn="just">
               <a:lnSpc>
                 <a:spcPct val="100000"/>
               </a:lnSpc>
-              <a:buClr>
-                <a:srgbClr val="000000"/>
-              </a:buClr>
-              <a:buSzPct val="45000"/>
-              <a:buFont typeface="Symbol"/>
-              <a:buChar char=""/>
             </a:pPr>
             <a:r>
               <a:rPr b="0" lang="en-US" sz="3200" spc="-1" strike="noStrike">
@@ -3425,32 +3657,8 @@
                 <a:latin typeface="Arial"/>
                 <a:ea typeface="DejaVu Sans"/>
               </a:rPr>
-              <a:t>At each instant, the overtaking and following manoeuvres are evaluated against each other</a:t>
-            </a:r>
-            <a:endParaRPr b="0" lang="en-US" sz="1800" spc="-1" strike="noStrike">
-              <a:solidFill>
-                <a:srgbClr val="000000"/>
-              </a:solidFill>
-              <a:uFill>
-                <a:solidFill>
-                  <a:srgbClr val="ffffff"/>
-                </a:solidFill>
-              </a:uFill>
-              <a:latin typeface="Arial"/>
-            </a:endParaRPr>
-          </a:p>
-          <a:p>
-            <a:pPr marL="432000" indent="-323280" algn="just">
-              <a:lnSpc>
-                <a:spcPct val="100000"/>
-              </a:lnSpc>
-              <a:buClr>
-                <a:srgbClr val="000000"/>
-              </a:buClr>
-              <a:buSzPct val="45000"/>
-              <a:buFont typeface="Symbol"/>
-              <a:buChar char=""/>
-            </a:pPr>
+              <a:t>	</a:t>
+            </a:r>
             <a:r>
               <a:rPr b="0" lang="en-US" sz="3200" spc="-1" strike="noStrike">
                 <a:solidFill>
@@ -3464,7 +3672,127 @@
                 <a:latin typeface="Arial"/>
                 <a:ea typeface="DejaVu Sans"/>
               </a:rPr>
-              <a:t>This is done using an objective function that compares the kinematics of the manoeuvres, the deviation from the reference speed and the decision robustness. </a:t>
+              <a:t>The host follows a slower moving pilot at 50kph while another vehicle </a:t>
+            </a:r>
+            <a:r>
+              <a:rPr b="0" lang="en-US" sz="3200" spc="-1" strike="noStrike">
+                <a:solidFill>
+                  <a:srgbClr val="000000"/>
+                </a:solidFill>
+                <a:uFill>
+                  <a:solidFill>
+                    <a:srgbClr val="ffffff"/>
+                  </a:solidFill>
+                </a:uFill>
+                <a:latin typeface="Arial"/>
+                <a:ea typeface="DejaVu Sans"/>
+              </a:rPr>
+              <a:t>	</a:t>
+            </a:r>
+            <a:r>
+              <a:rPr b="0" lang="en-US" sz="3200" spc="-1" strike="noStrike">
+                <a:solidFill>
+                  <a:srgbClr val="000000"/>
+                </a:solidFill>
+                <a:uFill>
+                  <a:solidFill>
+                    <a:srgbClr val="ffffff"/>
+                  </a:solidFill>
+                </a:uFill>
+                <a:latin typeface="Arial"/>
+                <a:ea typeface="DejaVu Sans"/>
+              </a:rPr>
+              <a:t>	</a:t>
+            </a:r>
+            <a:r>
+              <a:rPr b="0" lang="en-US" sz="3200" spc="-1" strike="noStrike">
+                <a:solidFill>
+                  <a:srgbClr val="000000"/>
+                </a:solidFill>
+                <a:uFill>
+                  <a:solidFill>
+                    <a:srgbClr val="ffffff"/>
+                  </a:solidFill>
+                </a:uFill>
+                <a:latin typeface="Arial"/>
+                <a:ea typeface="DejaVu Sans"/>
+              </a:rPr>
+              <a:t>drives a distance away on the adjacent lane at 50kph. Initially, an </a:t>
+            </a:r>
+            <a:r>
+              <a:rPr b="0" lang="en-US" sz="3200" spc="-1" strike="noStrike">
+                <a:solidFill>
+                  <a:srgbClr val="000000"/>
+                </a:solidFill>
+                <a:uFill>
+                  <a:solidFill>
+                    <a:srgbClr val="ffffff"/>
+                  </a:solidFill>
+                </a:uFill>
+                <a:latin typeface="Arial"/>
+                <a:ea typeface="DejaVu Sans"/>
+              </a:rPr>
+              <a:t>	</a:t>
+            </a:r>
+            <a:r>
+              <a:rPr b="0" lang="en-US" sz="3200" spc="-1" strike="noStrike">
+                <a:solidFill>
+                  <a:srgbClr val="000000"/>
+                </a:solidFill>
+                <a:uFill>
+                  <a:solidFill>
+                    <a:srgbClr val="ffffff"/>
+                  </a:solidFill>
+                </a:uFill>
+                <a:latin typeface="Arial"/>
+                <a:ea typeface="DejaVu Sans"/>
+              </a:rPr>
+              <a:t>	</a:t>
+            </a:r>
+            <a:r>
+              <a:rPr b="0" lang="en-US" sz="3200" spc="-1" strike="noStrike">
+                <a:solidFill>
+                  <a:srgbClr val="000000"/>
+                </a:solidFill>
+                <a:uFill>
+                  <a:solidFill>
+                    <a:srgbClr val="ffffff"/>
+                  </a:solidFill>
+                </a:uFill>
+                <a:latin typeface="Arial"/>
+                <a:ea typeface="DejaVu Sans"/>
+              </a:rPr>
+              <a:t>	</a:t>
+            </a:r>
+            <a:r>
+              <a:rPr b="0" lang="en-US" sz="3200" spc="-1" strike="noStrike">
+                <a:solidFill>
+                  <a:srgbClr val="000000"/>
+                </a:solidFill>
+                <a:uFill>
+                  <a:solidFill>
+                    <a:srgbClr val="ffffff"/>
+                  </a:solidFill>
+                </a:uFill>
+                <a:latin typeface="Arial"/>
+                <a:ea typeface="DejaVu Sans"/>
+              </a:rPr>
+              <a:t>	</a:t>
+            </a:r>
+            <a:r>
+              <a:rPr b="0" lang="en-US" sz="3200" spc="-1" strike="noStrike">
+                <a:solidFill>
+                  <a:srgbClr val="000000"/>
+                </a:solidFill>
+                <a:uFill>
+                  <a:solidFill>
+                    <a:srgbClr val="ffffff"/>
+                  </a:solidFill>
+                </a:uFill>
+                <a:latin typeface="Arial"/>
+                <a:ea typeface="DejaVu Sans"/>
+              </a:rPr>
+              <a:t>overtake is deemed necessary and the host begins the lane change. </a:t>
             </a:r>
             <a:endParaRPr b="0" lang="en-US" sz="1800" spc="-1" strike="noStrike">
               <a:solidFill>
@@ -3480,16 +3808,39 @@
           </a:p>
         </p:txBody>
       </p:sp>
-      <p:sp>
-        <p:nvSpPr>
-          <p:cNvPr id="64" name="CustomShape 11"/>
-          <p:cNvSpPr/>
+      <p:pic>
+        <p:nvPicPr>
+          <p:cNvPr id="65" name="" descr=""/>
+          <p:cNvPicPr/>
           <p:nvPr/>
-        </p:nvSpPr>
-        <p:spPr>
-          <a:xfrm>
-            <a:off x="902880" y="24475680"/>
-            <a:ext cx="9486000" cy="4467960"/>
+        </p:nvPicPr>
+        <p:blipFill>
+          <a:blip r:embed="rId3"/>
+          <a:stretch/>
+        </p:blipFill>
+        <p:spPr>
+          <a:xfrm>
+            <a:off x="1146600" y="30998160"/>
+            <a:ext cx="9205200" cy="2605320"/>
+          </a:xfrm>
+          <a:prstGeom prst="rect">
+            <a:avLst/>
+          </a:prstGeom>
+          <a:ln>
+            <a:noFill/>
+          </a:ln>
+        </p:spPr>
+      </p:pic>
+      <p:sp>
+        <p:nvSpPr>
+          <p:cNvPr id="66" name="TextShape 11"/>
+          <p:cNvSpPr txBox="1"/>
+          <p:nvPr/>
+        </p:nvSpPr>
+        <p:spPr>
+          <a:xfrm>
+            <a:off x="1269000" y="28803600"/>
+            <a:ext cx="9155160" cy="1457640"/>
           </a:xfrm>
           <a:prstGeom prst="rect">
             <a:avLst/>
@@ -3499,28 +3850,68 @@
             <a:noFill/>
           </a:ln>
         </p:spPr>
-        <p:style>
-          <a:lnRef idx="0"/>
-          <a:fillRef idx="0"/>
-          <a:effectRef idx="0"/>
-          <a:fontRef idx="minor"/>
-        </p:style>
         <p:txBody>
           <a:bodyPr lIns="90000" rIns="90000" tIns="45000" bIns="45000"/>
           <a:p>
-            <a:pPr marL="432000" indent="-323280">
+            <a:pPr algn="just"/>
+            <a:r>
+              <a:rPr b="0" lang="en-US" sz="3200" spc="-1" strike="noStrike">
+                <a:solidFill>
+                  <a:srgbClr val="000000"/>
+                </a:solidFill>
+                <a:uFill>
+                  <a:solidFill>
+                    <a:srgbClr val="ffffff"/>
+                  </a:solidFill>
+                </a:uFill>
+                <a:latin typeface="Arial"/>
+              </a:rPr>
+              <a:t>Later, when the leading vehicle has slowed down to 60kph, following becomes more expensive and the decision to overtake is made.</a:t>
+            </a:r>
+            <a:endParaRPr b="0" lang="en-US" sz="3200" spc="-1" strike="noStrike">
+              <a:solidFill>
+                <a:srgbClr val="000000"/>
+              </a:solidFill>
+              <a:uFill>
+                <a:solidFill>
+                  <a:srgbClr val="ffffff"/>
+                </a:solidFill>
+              </a:uFill>
+              <a:latin typeface="Arial"/>
+              <a:ea typeface="DejaVu Sans"/>
+            </a:endParaRPr>
+          </a:p>
+        </p:txBody>
+      </p:sp>
+      <p:sp>
+        <p:nvSpPr>
+          <p:cNvPr id="67" name="TextShape 12"/>
+          <p:cNvSpPr txBox="1"/>
+          <p:nvPr/>
+        </p:nvSpPr>
+        <p:spPr>
+          <a:xfrm>
+            <a:off x="11275200" y="24688800"/>
+            <a:ext cx="13505040" cy="1913760"/>
+          </a:xfrm>
+          <a:prstGeom prst="rect">
+            <a:avLst/>
+          </a:prstGeom>
+          <a:noFill/>
+          <a:ln>
+            <a:noFill/>
+          </a:ln>
+        </p:spPr>
+        <p:txBody>
+          <a:bodyPr lIns="90000" rIns="90000" tIns="45000" bIns="45000"/>
+          <a:p>
+            <a:pPr algn="just">
               <a:lnSpc>
                 <a:spcPct val="100000"/>
               </a:lnSpc>
-              <a:buClr>
-                <a:srgbClr val="000000"/>
-              </a:buClr>
-              <a:buSzPct val="45000"/>
-              <a:buFont typeface="Wingdings" charset="2"/>
-              <a:buChar char=""/>
             </a:pPr>
             <a:r>
-              <a:rPr b="1" lang="en-US" sz="4800" spc="-1" strike="noStrike">
+              <a:rPr b="0" i="1" lang="en-US" sz="3200" spc="-1" strike="noStrike">
                 <a:solidFill>
                   <a:srgbClr val="000000"/>
                 </a:solidFill>
@@ -3532,7 +3923,22 @@
                 <a:latin typeface="Arial"/>
                 <a:ea typeface="DejaVu Sans"/>
               </a:rPr>
-              <a:t>Evaluation</a:t>
+              <a:t> </a:t>
+            </a:r>
+            <a:r>
+              <a:rPr b="0" i="1" lang="en-US" sz="3200" spc="-1" strike="noStrike">
+                <a:solidFill>
+                  <a:srgbClr val="000000"/>
+                </a:solidFill>
+                <a:uFill>
+                  <a:solidFill>
+                    <a:srgbClr val="ffffff"/>
+                  </a:solidFill>
+                </a:uFill>
+                <a:latin typeface="Arial"/>
+                <a:ea typeface="DejaVu Sans"/>
+              </a:rPr>
+              <a:t>III. Scenario 3</a:t>
             </a:r>
             <a:endParaRPr b="0" lang="en-US" sz="1800" spc="-1" strike="noStrike">
               <a:solidFill>
@@ -3547,46 +3953,11 @@
             </a:endParaRPr>
           </a:p>
           <a:p>
-            <a:pPr marL="108360" indent="-323280" algn="just">
+            <a:pPr algn="just">
               <a:lnSpc>
                 <a:spcPct val="100000"/>
               </a:lnSpc>
-              <a:buClr>
-                <a:srgbClr val="000000"/>
-              </a:buClr>
-              <a:buFont typeface="Liberation Serif"/>
-              <a:buAutoNum type="romanUcPeriod"/>
             </a:pPr>
-            <a:r>
-              <a:rPr b="0" lang="en-US" sz="3200" spc="-1" strike="noStrike">
-                <a:solidFill>
-                  <a:srgbClr val="000000"/>
-                </a:solidFill>
-                <a:uFill>
-                  <a:solidFill>
-                    <a:srgbClr val="ffffff"/>
-                  </a:solidFill>
-                </a:uFill>
-                <a:latin typeface="Arial"/>
-                <a:ea typeface="DejaVu Sans"/>
-              </a:rPr>
-              <a:t>  </a:t>
-            </a:r>
-            <a:r>
-              <a:rPr b="0" i="1" lang="en-US" sz="3200" spc="-1" strike="noStrike">
-                <a:solidFill>
-                  <a:srgbClr val="000000"/>
-                </a:solidFill>
-                <a:uFill>
-                  <a:solidFill>
-                    <a:srgbClr val="ffffff"/>
-                  </a:solidFill>
-                </a:uFill>
-                <a:latin typeface="Arial"/>
-                <a:ea typeface="DejaVu Sans"/>
-              </a:rPr>
-              <a:t>Scenario 1 - Leading vehicle with deceleration - </a:t>
-            </a:r>
             <a:endParaRPr b="0" lang="en-US" sz="1800" spc="-1" strike="noStrike">
               <a:solidFill>
                 <a:srgbClr val="000000"/>
@@ -3600,18 +3971,13 @@
             </a:endParaRPr>
           </a:p>
           <a:p>
-            <a:pPr lvl="2" marL="432000" indent="-216000" algn="just">
+            <a:pPr algn="just">
               <a:lnSpc>
                 <a:spcPct val="100000"/>
               </a:lnSpc>
-              <a:buClr>
-                <a:srgbClr val="000000"/>
-              </a:buClr>
-              <a:buFont typeface="Liberation Serif"/>
-              <a:buAutoNum type="romanUcPeriod"/>
             </a:pPr>
             <a:r>
-              <a:rPr b="0" lang="en-US" sz="3200" spc="-1" strike="noStrike">
+              <a:rPr b="0" i="1" lang="en-US" sz="3200" spc="-1" strike="noStrike">
                 <a:solidFill>
                   <a:srgbClr val="000000"/>
                 </a:solidFill>
@@ -3623,22 +3989,7 @@
                 <a:latin typeface="Arial"/>
                 <a:ea typeface="DejaVu Sans"/>
               </a:rPr>
-              <a:t>The host</a:t>
-            </a:r>
-            <a:r>
-              <a:rPr b="0" lang="en-US" sz="3200" spc="-1" strike="noStrike">
-                <a:solidFill>
-                  <a:srgbClr val="000000"/>
-                </a:solidFill>
-                <a:uFill>
-                  <a:solidFill>
-                    <a:srgbClr val="ffffff"/>
-                  </a:solidFill>
-                </a:uFill>
-                <a:latin typeface="Arial"/>
-                <a:ea typeface="DejaVu Sans"/>
-              </a:rPr>
-              <a:t> follows a vehicle that slows down making an overtake necessary</a:t>
+              <a:t> </a:t>
             </a:r>
             <a:endParaRPr b="0" lang="en-US" sz="1800" spc="-1" strike="noStrike">
               <a:solidFill>
@@ -3652,19 +4003,60 @@
               <a:latin typeface="Arial"/>
             </a:endParaRPr>
           </a:p>
-          <a:p>
-            <a:pPr lvl="2" marL="432000" indent="-216000" algn="just">
+        </p:txBody>
+      </p:sp>
+      <p:pic>
+        <p:nvPicPr>
+          <p:cNvPr id="68" name="" descr=""/>
+          <p:cNvPicPr/>
+          <p:nvPr/>
+        </p:nvPicPr>
+        <p:blipFill>
+          <a:blip r:embed="rId4"/>
+          <a:stretch/>
+        </p:blipFill>
+        <p:spPr>
+          <a:xfrm>
+            <a:off x="11338560" y="9998280"/>
+            <a:ext cx="12801600" cy="5180760"/>
+          </a:xfrm>
+          <a:prstGeom prst="rect">
+            <a:avLst/>
+          </a:prstGeom>
+          <a:ln>
+            <a:noFill/>
+          </a:ln>
+        </p:spPr>
+      </p:pic>
+      <p:sp>
+        <p:nvSpPr>
+          <p:cNvPr id="69" name="TextShape 13"/>
+          <p:cNvSpPr txBox="1"/>
+          <p:nvPr/>
+        </p:nvSpPr>
+        <p:spPr>
+          <a:xfrm>
+            <a:off x="10881360" y="15636240"/>
+            <a:ext cx="13505040" cy="1188720"/>
+          </a:xfrm>
+          <a:prstGeom prst="rect">
+            <a:avLst/>
+          </a:prstGeom>
+          <a:noFill/>
+          <a:ln>
+            <a:noFill/>
+          </a:ln>
+        </p:spPr>
+        <p:txBody>
+          <a:bodyPr lIns="90000" rIns="90000" tIns="45000" bIns="45000"/>
+          <a:p>
+            <a:pPr algn="just">
               <a:lnSpc>
                 <a:spcPct val="100000"/>
               </a:lnSpc>
-              <a:buClr>
-                <a:srgbClr val="000000"/>
-              </a:buClr>
-              <a:buFont typeface="Liberation Serif"/>
-              <a:buAutoNum type="romanUcPeriod"/>
             </a:pPr>
             <a:r>
-              <a:rPr b="0" i="1" lang="en-US" sz="3200" spc="-1" strike="noStrike">
+              <a:rPr b="0" lang="en-US" sz="3200" spc="-1" strike="noStrike">
                 <a:solidFill>
                   <a:srgbClr val="000000"/>
                 </a:solidFill>
@@ -3676,7 +4068,7 @@
                 <a:latin typeface="Arial"/>
                 <a:ea typeface="DejaVu Sans"/>
               </a:rPr>
-              <a:t> </a:t>
+              <a:t>In the middle of the lane change, the vehicle in the adjacent lane slows down to 40kph requiring the host to abort the manoeuvre.</a:t>
             </a:r>
             <a:endParaRPr b="0" lang="en-US" sz="1800" spc="-1" strike="noStrike">
               <a:solidFill>
@@ -3692,6 +4084,29 @@
           </a:p>
         </p:txBody>
       </p:sp>
+      <p:pic>
+        <p:nvPicPr>
+          <p:cNvPr id="70" name="" descr=""/>
+          <p:cNvPicPr/>
+          <p:nvPr/>
+        </p:nvPicPr>
+        <p:blipFill>
+          <a:blip r:embed="rId5"/>
+          <a:stretch/>
+        </p:blipFill>
+        <p:spPr>
+          <a:xfrm>
+            <a:off x="11788200" y="16745400"/>
+            <a:ext cx="12133440" cy="7558560"/>
+          </a:xfrm>
+          <a:prstGeom prst="rect">
+            <a:avLst/>
+          </a:prstGeom>
+          <a:ln>
+            <a:noFill/>
+          </a:ln>
+        </p:spPr>
+      </p:pic>
     </p:spTree>
   </p:cSld>
   <p:timing>

</xml_diff>